<commit_message>
Moved dimensionality reduction slides
</commit_message>
<xml_diff>
--- a/slides/9_IntroductionToClustering_Part2.pptx
+++ b/slides/9_IntroductionToClustering_Part2.pptx
@@ -242,7 +242,7 @@
           <a:p>
             <a:fld id="{ED460DB7-3564-4028-881B-4A225B453265}" type="datetimeFigureOut">
               <a:rPr lang="en-US" smtClean="0"/>
-              <a:t>5/31/2023</a:t>
+              <a:t>7/16/2023</a:t>
             </a:fld>
             <a:endParaRPr lang="en-US"/>
           </a:p>
@@ -3631,7 +3631,7 @@
           <a:p>
             <a:fld id="{C62B3463-61C8-4819-BC9A-C94FD847F060}" type="datetimeFigureOut">
               <a:rPr lang="en-US" smtClean="0"/>
-              <a:t>5/31/2023</a:t>
+              <a:t>7/16/2023</a:t>
             </a:fld>
             <a:endParaRPr lang="en-US"/>
           </a:p>
@@ -3829,7 +3829,7 @@
           <a:p>
             <a:fld id="{C62B3463-61C8-4819-BC9A-C94FD847F060}" type="datetimeFigureOut">
               <a:rPr lang="en-US" smtClean="0"/>
-              <a:t>5/31/2023</a:t>
+              <a:t>7/16/2023</a:t>
             </a:fld>
             <a:endParaRPr lang="en-US"/>
           </a:p>
@@ -4037,7 +4037,7 @@
           <a:p>
             <a:fld id="{C62B3463-61C8-4819-BC9A-C94FD847F060}" type="datetimeFigureOut">
               <a:rPr lang="en-US" smtClean="0"/>
-              <a:t>5/31/2023</a:t>
+              <a:t>7/16/2023</a:t>
             </a:fld>
             <a:endParaRPr lang="en-US"/>
           </a:p>
@@ -5457,7 +5457,7 @@
           <a:p>
             <a:fld id="{C62B3463-61C8-4819-BC9A-C94FD847F060}" type="datetimeFigureOut">
               <a:rPr lang="en-US" smtClean="0"/>
-              <a:t>5/31/2023</a:t>
+              <a:t>7/16/2023</a:t>
             </a:fld>
             <a:endParaRPr lang="en-US"/>
           </a:p>
@@ -5898,7 +5898,7 @@
           <a:p>
             <a:fld id="{4ACD6B4E-9726-48B7-95FC-86DC5068328F}" type="datetimeFigureOut">
               <a:rPr lang="en-US" smtClean="0"/>
-              <a:t>5/31/2023</a:t>
+              <a:t>7/16/2023</a:t>
             </a:fld>
             <a:endParaRPr lang="en-US"/>
           </a:p>
@@ -6173,7 +6173,7 @@
           <a:p>
             <a:fld id="{C62B3463-61C8-4819-BC9A-C94FD847F060}" type="datetimeFigureOut">
               <a:rPr lang="en-US" smtClean="0"/>
-              <a:t>5/31/2023</a:t>
+              <a:t>7/16/2023</a:t>
             </a:fld>
             <a:endParaRPr lang="en-US"/>
           </a:p>
@@ -6438,7 +6438,7 @@
           <a:p>
             <a:fld id="{C62B3463-61C8-4819-BC9A-C94FD847F060}" type="datetimeFigureOut">
               <a:rPr lang="en-US" smtClean="0"/>
-              <a:t>5/31/2023</a:t>
+              <a:t>7/16/2023</a:t>
             </a:fld>
             <a:endParaRPr lang="en-US"/>
           </a:p>
@@ -6850,7 +6850,7 @@
           <a:p>
             <a:fld id="{C62B3463-61C8-4819-BC9A-C94FD847F060}" type="datetimeFigureOut">
               <a:rPr lang="en-US" smtClean="0"/>
-              <a:t>5/31/2023</a:t>
+              <a:t>7/16/2023</a:t>
             </a:fld>
             <a:endParaRPr lang="en-US"/>
           </a:p>
@@ -6991,7 +6991,7 @@
           <a:p>
             <a:fld id="{C62B3463-61C8-4819-BC9A-C94FD847F060}" type="datetimeFigureOut">
               <a:rPr lang="en-US" smtClean="0"/>
-              <a:t>5/31/2023</a:t>
+              <a:t>7/16/2023</a:t>
             </a:fld>
             <a:endParaRPr lang="en-US"/>
           </a:p>
@@ -7104,7 +7104,7 @@
           <a:p>
             <a:fld id="{C62B3463-61C8-4819-BC9A-C94FD847F060}" type="datetimeFigureOut">
               <a:rPr lang="en-US" smtClean="0"/>
-              <a:t>5/31/2023</a:t>
+              <a:t>7/16/2023</a:t>
             </a:fld>
             <a:endParaRPr lang="en-US"/>
           </a:p>
@@ -7415,7 +7415,7 @@
           <a:p>
             <a:fld id="{C62B3463-61C8-4819-BC9A-C94FD847F060}" type="datetimeFigureOut">
               <a:rPr lang="en-US" smtClean="0"/>
-              <a:t>5/31/2023</a:t>
+              <a:t>7/16/2023</a:t>
             </a:fld>
             <a:endParaRPr lang="en-US"/>
           </a:p>
@@ -7703,7 +7703,7 @@
           <a:p>
             <a:fld id="{C62B3463-61C8-4819-BC9A-C94FD847F060}" type="datetimeFigureOut">
               <a:rPr lang="en-US" smtClean="0"/>
-              <a:t>5/31/2023</a:t>
+              <a:t>7/16/2023</a:t>
             </a:fld>
             <a:endParaRPr lang="en-US"/>
           </a:p>
@@ -7944,7 +7944,7 @@
           <a:p>
             <a:fld id="{C62B3463-61C8-4819-BC9A-C94FD847F060}" type="datetimeFigureOut">
               <a:rPr lang="en-US" smtClean="0"/>
-              <a:t>5/31/2023</a:t>
+              <a:t>7/16/2023</a:t>
             </a:fld>
             <a:endParaRPr lang="en-US"/>
           </a:p>
@@ -9354,33 +9354,15 @@
                                   </p:childTnLst>
                                 </p:cTn>
                               </p:par>
-                            </p:childTnLst>
-                          </p:cTn>
-                        </p:par>
-                      </p:childTnLst>
-                    </p:cTn>
-                  </p:par>
-                  <p:par>
-                    <p:cTn id="7" fill="hold">
-                      <p:stCondLst>
-                        <p:cond delay="indefinite"/>
-                      </p:stCondLst>
-                      <p:childTnLst>
-                        <p:par>
-                          <p:cTn id="8" fill="hold">
-                            <p:stCondLst>
-                              <p:cond delay="0"/>
-                            </p:stCondLst>
-                            <p:childTnLst>
                               <p:par>
-                                <p:cTn id="9" presetID="1" presetClass="entr" presetSubtype="0" fill="hold" nodeType="clickEffect">
+                                <p:cTn id="7" presetID="1" presetClass="entr" presetSubtype="0" fill="hold" nodeType="withEffect">
                                   <p:stCondLst>
                                     <p:cond delay="0"/>
                                   </p:stCondLst>
                                   <p:childTnLst>
                                     <p:set>
                                       <p:cBhvr>
-                                        <p:cTn id="10" dur="1" fill="hold">
+                                        <p:cTn id="8" dur="1" fill="hold">
                                           <p:stCondLst>
                                             <p:cond delay="0"/>
                                           </p:stCondLst>
@@ -9403,33 +9385,15 @@
                                   </p:childTnLst>
                                 </p:cTn>
                               </p:par>
-                            </p:childTnLst>
-                          </p:cTn>
-                        </p:par>
-                      </p:childTnLst>
-                    </p:cTn>
-                  </p:par>
-                  <p:par>
-                    <p:cTn id="11" fill="hold">
-                      <p:stCondLst>
-                        <p:cond delay="indefinite"/>
-                      </p:stCondLst>
-                      <p:childTnLst>
-                        <p:par>
-                          <p:cTn id="12" fill="hold">
-                            <p:stCondLst>
-                              <p:cond delay="0"/>
-                            </p:stCondLst>
-                            <p:childTnLst>
                               <p:par>
-                                <p:cTn id="13" presetID="1" presetClass="entr" presetSubtype="0" fill="hold" nodeType="clickEffect">
+                                <p:cTn id="9" presetID="1" presetClass="entr" presetSubtype="0" fill="hold" nodeType="withEffect">
                                   <p:stCondLst>
                                     <p:cond delay="0"/>
                                   </p:stCondLst>
                                   <p:childTnLst>
                                     <p:set>
                                       <p:cBhvr>
-                                        <p:cTn id="14" dur="1" fill="hold">
+                                        <p:cTn id="10" dur="1" fill="hold">
                                           <p:stCondLst>
                                             <p:cond delay="0"/>
                                           </p:stCondLst>
@@ -9452,33 +9416,15 @@
                                   </p:childTnLst>
                                 </p:cTn>
                               </p:par>
-                            </p:childTnLst>
-                          </p:cTn>
-                        </p:par>
-                      </p:childTnLst>
-                    </p:cTn>
-                  </p:par>
-                  <p:par>
-                    <p:cTn id="15" fill="hold">
-                      <p:stCondLst>
-                        <p:cond delay="indefinite"/>
-                      </p:stCondLst>
-                      <p:childTnLst>
-                        <p:par>
-                          <p:cTn id="16" fill="hold">
-                            <p:stCondLst>
-                              <p:cond delay="0"/>
-                            </p:stCondLst>
-                            <p:childTnLst>
                               <p:par>
-                                <p:cTn id="17" presetID="1" presetClass="entr" presetSubtype="0" fill="hold" nodeType="clickEffect">
+                                <p:cTn id="11" presetID="1" presetClass="entr" presetSubtype="0" fill="hold" nodeType="withEffect">
                                   <p:stCondLst>
                                     <p:cond delay="0"/>
                                   </p:stCondLst>
                                   <p:childTnLst>
                                     <p:set>
                                       <p:cBhvr>
-                                        <p:cTn id="18" dur="1" fill="hold">
+                                        <p:cTn id="12" dur="1" fill="hold">
                                           <p:stCondLst>
                                             <p:cond delay="0"/>
                                           </p:stCondLst>
@@ -9508,26 +9454,26 @@
                     </p:cTn>
                   </p:par>
                   <p:par>
-                    <p:cTn id="19" fill="hold">
+                    <p:cTn id="13" fill="hold">
                       <p:stCondLst>
                         <p:cond delay="indefinite"/>
                       </p:stCondLst>
                       <p:childTnLst>
                         <p:par>
-                          <p:cTn id="20" fill="hold">
+                          <p:cTn id="14" fill="hold">
                             <p:stCondLst>
                               <p:cond delay="0"/>
                             </p:stCondLst>
                             <p:childTnLst>
                               <p:par>
-                                <p:cTn id="21" presetID="1" presetClass="entr" presetSubtype="0" fill="hold" nodeType="clickEffect">
+                                <p:cTn id="15" presetID="1" presetClass="entr" presetSubtype="0" fill="hold" nodeType="clickEffect">
                                   <p:stCondLst>
                                     <p:cond delay="0"/>
                                   </p:stCondLst>
                                   <p:childTnLst>
                                     <p:set>
                                       <p:cBhvr>
-                                        <p:cTn id="22" dur="1" fill="hold">
+                                        <p:cTn id="16" dur="1" fill="hold">
                                           <p:stCondLst>
                                             <p:cond delay="0"/>
                                           </p:stCondLst>
@@ -9557,26 +9503,26 @@
                     </p:cTn>
                   </p:par>
                   <p:par>
-                    <p:cTn id="23" fill="hold">
+                    <p:cTn id="17" fill="hold">
                       <p:stCondLst>
                         <p:cond delay="indefinite"/>
                       </p:stCondLst>
                       <p:childTnLst>
                         <p:par>
-                          <p:cTn id="24" fill="hold">
+                          <p:cTn id="18" fill="hold">
                             <p:stCondLst>
                               <p:cond delay="0"/>
                             </p:stCondLst>
                             <p:childTnLst>
                               <p:par>
-                                <p:cTn id="25" presetID="1" presetClass="entr" presetSubtype="0" fill="hold" nodeType="clickEffect">
+                                <p:cTn id="19" presetID="1" presetClass="entr" presetSubtype="0" fill="hold" nodeType="clickEffect">
                                   <p:stCondLst>
                                     <p:cond delay="0"/>
                                   </p:stCondLst>
                                   <p:childTnLst>
                                     <p:set>
                                       <p:cBhvr>
-                                        <p:cTn id="26" dur="1" fill="hold">
+                                        <p:cTn id="20" dur="1" fill="hold">
                                           <p:stCondLst>
                                             <p:cond delay="0"/>
                                           </p:stCondLst>
@@ -9599,33 +9545,15 @@
                                   </p:childTnLst>
                                 </p:cTn>
                               </p:par>
-                            </p:childTnLst>
-                          </p:cTn>
-                        </p:par>
-                      </p:childTnLst>
-                    </p:cTn>
-                  </p:par>
-                  <p:par>
-                    <p:cTn id="27" fill="hold">
-                      <p:stCondLst>
-                        <p:cond delay="indefinite"/>
-                      </p:stCondLst>
-                      <p:childTnLst>
-                        <p:par>
-                          <p:cTn id="28" fill="hold">
-                            <p:stCondLst>
-                              <p:cond delay="0"/>
-                            </p:stCondLst>
-                            <p:childTnLst>
                               <p:par>
-                                <p:cTn id="29" presetID="1" presetClass="entr" presetSubtype="0" fill="hold" nodeType="clickEffect">
+                                <p:cTn id="21" presetID="1" presetClass="entr" presetSubtype="0" fill="hold" nodeType="withEffect">
                                   <p:stCondLst>
                                     <p:cond delay="0"/>
                                   </p:stCondLst>
                                   <p:childTnLst>
                                     <p:set>
                                       <p:cBhvr>
-                                        <p:cTn id="30" dur="1" fill="hold">
+                                        <p:cTn id="22" dur="1" fill="hold">
                                           <p:stCondLst>
                                             <p:cond delay="0"/>
                                           </p:stCondLst>
@@ -9648,33 +9576,15 @@
                                   </p:childTnLst>
                                 </p:cTn>
                               </p:par>
-                            </p:childTnLst>
-                          </p:cTn>
-                        </p:par>
-                      </p:childTnLst>
-                    </p:cTn>
-                  </p:par>
-                  <p:par>
-                    <p:cTn id="31" fill="hold">
-                      <p:stCondLst>
-                        <p:cond delay="indefinite"/>
-                      </p:stCondLst>
-                      <p:childTnLst>
-                        <p:par>
-                          <p:cTn id="32" fill="hold">
-                            <p:stCondLst>
-                              <p:cond delay="0"/>
-                            </p:stCondLst>
-                            <p:childTnLst>
                               <p:par>
-                                <p:cTn id="33" presetID="1" presetClass="entr" presetSubtype="0" fill="hold" nodeType="clickEffect">
+                                <p:cTn id="23" presetID="1" presetClass="entr" presetSubtype="0" fill="hold" nodeType="withEffect">
                                   <p:stCondLst>
                                     <p:cond delay="0"/>
                                   </p:stCondLst>
                                   <p:childTnLst>
                                     <p:set>
                                       <p:cBhvr>
-                                        <p:cTn id="34" dur="1" fill="hold">
+                                        <p:cTn id="24" dur="1" fill="hold">
                                           <p:stCondLst>
                                             <p:cond delay="0"/>
                                           </p:stCondLst>
@@ -9697,33 +9607,15 @@
                                   </p:childTnLst>
                                 </p:cTn>
                               </p:par>
-                            </p:childTnLst>
-                          </p:cTn>
-                        </p:par>
-                      </p:childTnLst>
-                    </p:cTn>
-                  </p:par>
-                  <p:par>
-                    <p:cTn id="35" fill="hold">
-                      <p:stCondLst>
-                        <p:cond delay="indefinite"/>
-                      </p:stCondLst>
-                      <p:childTnLst>
-                        <p:par>
-                          <p:cTn id="36" fill="hold">
-                            <p:stCondLst>
-                              <p:cond delay="0"/>
-                            </p:stCondLst>
-                            <p:childTnLst>
                               <p:par>
-                                <p:cTn id="37" presetID="1" presetClass="entr" presetSubtype="0" fill="hold" nodeType="clickEffect">
+                                <p:cTn id="25" presetID="1" presetClass="entr" presetSubtype="0" fill="hold" nodeType="withEffect">
                                   <p:stCondLst>
                                     <p:cond delay="0"/>
                                   </p:stCondLst>
                                   <p:childTnLst>
                                     <p:set>
                                       <p:cBhvr>
-                                        <p:cTn id="38" dur="1" fill="hold">
+                                        <p:cTn id="26" dur="1" fill="hold">
                                           <p:stCondLst>
                                             <p:cond delay="0"/>
                                           </p:stCondLst>
@@ -9746,33 +9638,15 @@
                                   </p:childTnLst>
                                 </p:cTn>
                               </p:par>
-                            </p:childTnLst>
-                          </p:cTn>
-                        </p:par>
-                      </p:childTnLst>
-                    </p:cTn>
-                  </p:par>
-                  <p:par>
-                    <p:cTn id="39" fill="hold">
-                      <p:stCondLst>
-                        <p:cond delay="indefinite"/>
-                      </p:stCondLst>
-                      <p:childTnLst>
-                        <p:par>
-                          <p:cTn id="40" fill="hold">
-                            <p:stCondLst>
-                              <p:cond delay="0"/>
-                            </p:stCondLst>
-                            <p:childTnLst>
                               <p:par>
-                                <p:cTn id="41" presetID="1" presetClass="entr" presetSubtype="0" fill="hold" nodeType="clickEffect">
+                                <p:cTn id="27" presetID="1" presetClass="entr" presetSubtype="0" fill="hold" nodeType="withEffect">
                                   <p:stCondLst>
                                     <p:cond delay="0"/>
                                   </p:stCondLst>
                                   <p:childTnLst>
                                     <p:set>
                                       <p:cBhvr>
-                                        <p:cTn id="42" dur="1" fill="hold">
+                                        <p:cTn id="28" dur="1" fill="hold">
                                           <p:stCondLst>
                                             <p:cond delay="0"/>
                                           </p:stCondLst>
@@ -10161,33 +10035,15 @@
                                   </p:childTnLst>
                                 </p:cTn>
                               </p:par>
-                            </p:childTnLst>
-                          </p:cTn>
-                        </p:par>
-                      </p:childTnLst>
-                    </p:cTn>
-                  </p:par>
-                  <p:par>
-                    <p:cTn id="15" fill="hold">
-                      <p:stCondLst>
-                        <p:cond delay="indefinite"/>
-                      </p:stCondLst>
-                      <p:childTnLst>
-                        <p:par>
-                          <p:cTn id="16" fill="hold">
-                            <p:stCondLst>
-                              <p:cond delay="0"/>
-                            </p:stCondLst>
-                            <p:childTnLst>
                               <p:par>
-                                <p:cTn id="17" presetID="1" presetClass="entr" presetSubtype="0" fill="hold" nodeType="clickEffect">
+                                <p:cTn id="15" presetID="1" presetClass="entr" presetSubtype="0" fill="hold" nodeType="withEffect">
                                   <p:stCondLst>
                                     <p:cond delay="0"/>
                                   </p:stCondLst>
                                   <p:childTnLst>
                                     <p:set>
                                       <p:cBhvr>
-                                        <p:cTn id="18" dur="1" fill="hold">
+                                        <p:cTn id="16" dur="1" fill="hold">
                                           <p:stCondLst>
                                             <p:cond delay="0"/>
                                           </p:stCondLst>
@@ -10210,33 +10066,15 @@
                                   </p:childTnLst>
                                 </p:cTn>
                               </p:par>
-                            </p:childTnLst>
-                          </p:cTn>
-                        </p:par>
-                      </p:childTnLst>
-                    </p:cTn>
-                  </p:par>
-                  <p:par>
-                    <p:cTn id="19" fill="hold">
-                      <p:stCondLst>
-                        <p:cond delay="indefinite"/>
-                      </p:stCondLst>
-                      <p:childTnLst>
-                        <p:par>
-                          <p:cTn id="20" fill="hold">
-                            <p:stCondLst>
-                              <p:cond delay="0"/>
-                            </p:stCondLst>
-                            <p:childTnLst>
                               <p:par>
-                                <p:cTn id="21" presetID="1" presetClass="entr" presetSubtype="0" fill="hold" nodeType="clickEffect">
+                                <p:cTn id="17" presetID="1" presetClass="entr" presetSubtype="0" fill="hold" nodeType="withEffect">
                                   <p:stCondLst>
                                     <p:cond delay="0"/>
                                   </p:stCondLst>
                                   <p:childTnLst>
                                     <p:set>
                                       <p:cBhvr>
-                                        <p:cTn id="22" dur="1" fill="hold">
+                                        <p:cTn id="18" dur="1" fill="hold">
                                           <p:stCondLst>
                                             <p:cond delay="0"/>
                                           </p:stCondLst>
@@ -10259,33 +10097,15 @@
                                   </p:childTnLst>
                                 </p:cTn>
                               </p:par>
-                            </p:childTnLst>
-                          </p:cTn>
-                        </p:par>
-                      </p:childTnLst>
-                    </p:cTn>
-                  </p:par>
-                  <p:par>
-                    <p:cTn id="23" fill="hold">
-                      <p:stCondLst>
-                        <p:cond delay="indefinite"/>
-                      </p:stCondLst>
-                      <p:childTnLst>
-                        <p:par>
-                          <p:cTn id="24" fill="hold">
-                            <p:stCondLst>
-                              <p:cond delay="0"/>
-                            </p:stCondLst>
-                            <p:childTnLst>
                               <p:par>
-                                <p:cTn id="25" presetID="1" presetClass="entr" presetSubtype="0" fill="hold" nodeType="clickEffect">
+                                <p:cTn id="19" presetID="1" presetClass="entr" presetSubtype="0" fill="hold" nodeType="withEffect">
                                   <p:stCondLst>
                                     <p:cond delay="0"/>
                                   </p:stCondLst>
                                   <p:childTnLst>
                                     <p:set>
                                       <p:cBhvr>
-                                        <p:cTn id="26" dur="1" fill="hold">
+                                        <p:cTn id="20" dur="1" fill="hold">
                                           <p:stCondLst>
                                             <p:cond delay="0"/>
                                           </p:stCondLst>
@@ -10308,33 +10128,15 @@
                                   </p:childTnLst>
                                 </p:cTn>
                               </p:par>
-                            </p:childTnLst>
-                          </p:cTn>
-                        </p:par>
-                      </p:childTnLst>
-                    </p:cTn>
-                  </p:par>
-                  <p:par>
-                    <p:cTn id="27" fill="hold">
-                      <p:stCondLst>
-                        <p:cond delay="indefinite"/>
-                      </p:stCondLst>
-                      <p:childTnLst>
-                        <p:par>
-                          <p:cTn id="28" fill="hold">
-                            <p:stCondLst>
-                              <p:cond delay="0"/>
-                            </p:stCondLst>
-                            <p:childTnLst>
                               <p:par>
-                                <p:cTn id="29" presetID="1" presetClass="entr" presetSubtype="0" fill="hold" nodeType="clickEffect">
+                                <p:cTn id="21" presetID="1" presetClass="entr" presetSubtype="0" fill="hold" nodeType="withEffect">
                                   <p:stCondLst>
                                     <p:cond delay="0"/>
                                   </p:stCondLst>
                                   <p:childTnLst>
                                     <p:set>
                                       <p:cBhvr>
-                                        <p:cTn id="30" dur="1" fill="hold">
+                                        <p:cTn id="22" dur="1" fill="hold">
                                           <p:stCondLst>
                                             <p:cond delay="0"/>
                                           </p:stCondLst>
@@ -10768,33 +10570,15 @@
                                   </p:childTnLst>
                                 </p:cTn>
                               </p:par>
-                            </p:childTnLst>
-                          </p:cTn>
-                        </p:par>
-                      </p:childTnLst>
-                    </p:cTn>
-                  </p:par>
-                  <p:par>
-                    <p:cTn id="7" fill="hold">
-                      <p:stCondLst>
-                        <p:cond delay="indefinite"/>
-                      </p:stCondLst>
-                      <p:childTnLst>
-                        <p:par>
-                          <p:cTn id="8" fill="hold">
-                            <p:stCondLst>
-                              <p:cond delay="0"/>
-                            </p:stCondLst>
-                            <p:childTnLst>
                               <p:par>
-                                <p:cTn id="9" presetID="1" presetClass="entr" presetSubtype="0" fill="hold" nodeType="clickEffect">
+                                <p:cTn id="7" presetID="1" presetClass="entr" presetSubtype="0" fill="hold" nodeType="withEffect">
                                   <p:stCondLst>
                                     <p:cond delay="0"/>
                                   </p:stCondLst>
                                   <p:childTnLst>
                                     <p:set>
                                       <p:cBhvr>
-                                        <p:cTn id="10" dur="1" fill="hold">
+                                        <p:cTn id="8" dur="1" fill="hold">
                                           <p:stCondLst>
                                             <p:cond delay="0"/>
                                           </p:stCondLst>
@@ -10824,26 +10608,26 @@
                     </p:cTn>
                   </p:par>
                   <p:par>
-                    <p:cTn id="11" fill="hold">
+                    <p:cTn id="9" fill="hold">
                       <p:stCondLst>
                         <p:cond delay="indefinite"/>
                       </p:stCondLst>
                       <p:childTnLst>
                         <p:par>
-                          <p:cTn id="12" fill="hold">
+                          <p:cTn id="10" fill="hold">
                             <p:stCondLst>
                               <p:cond delay="0"/>
                             </p:stCondLst>
                             <p:childTnLst>
                               <p:par>
-                                <p:cTn id="13" presetID="1" presetClass="entr" presetSubtype="0" fill="hold" nodeType="clickEffect">
+                                <p:cTn id="11" presetID="1" presetClass="entr" presetSubtype="0" fill="hold" nodeType="clickEffect">
                                   <p:stCondLst>
                                     <p:cond delay="0"/>
                                   </p:stCondLst>
                                   <p:childTnLst>
                                     <p:set>
                                       <p:cBhvr>
-                                        <p:cTn id="14" dur="1" fill="hold">
+                                        <p:cTn id="12" dur="1" fill="hold">
                                           <p:stCondLst>
                                             <p:cond delay="0"/>
                                           </p:stCondLst>
@@ -10866,33 +10650,15 @@
                                   </p:childTnLst>
                                 </p:cTn>
                               </p:par>
-                            </p:childTnLst>
-                          </p:cTn>
-                        </p:par>
-                      </p:childTnLst>
-                    </p:cTn>
-                  </p:par>
-                  <p:par>
-                    <p:cTn id="15" fill="hold">
-                      <p:stCondLst>
-                        <p:cond delay="indefinite"/>
-                      </p:stCondLst>
-                      <p:childTnLst>
-                        <p:par>
-                          <p:cTn id="16" fill="hold">
-                            <p:stCondLst>
-                              <p:cond delay="0"/>
-                            </p:stCondLst>
-                            <p:childTnLst>
                               <p:par>
-                                <p:cTn id="17" presetID="1" presetClass="entr" presetSubtype="0" fill="hold" nodeType="clickEffect">
+                                <p:cTn id="13" presetID="1" presetClass="entr" presetSubtype="0" fill="hold" nodeType="withEffect">
                                   <p:stCondLst>
                                     <p:cond delay="0"/>
                                   </p:stCondLst>
                                   <p:childTnLst>
                                     <p:set>
                                       <p:cBhvr>
-                                        <p:cTn id="18" dur="1" fill="hold">
+                                        <p:cTn id="14" dur="1" fill="hold">
                                           <p:stCondLst>
                                             <p:cond delay="0"/>
                                           </p:stCondLst>
@@ -10915,33 +10681,15 @@
                                   </p:childTnLst>
                                 </p:cTn>
                               </p:par>
-                            </p:childTnLst>
-                          </p:cTn>
-                        </p:par>
-                      </p:childTnLst>
-                    </p:cTn>
-                  </p:par>
-                  <p:par>
-                    <p:cTn id="19" fill="hold">
-                      <p:stCondLst>
-                        <p:cond delay="indefinite"/>
-                      </p:stCondLst>
-                      <p:childTnLst>
-                        <p:par>
-                          <p:cTn id="20" fill="hold">
-                            <p:stCondLst>
-                              <p:cond delay="0"/>
-                            </p:stCondLst>
-                            <p:childTnLst>
                               <p:par>
-                                <p:cTn id="21" presetID="1" presetClass="entr" presetSubtype="0" fill="hold" nodeType="clickEffect">
+                                <p:cTn id="15" presetID="1" presetClass="entr" presetSubtype="0" fill="hold" nodeType="withEffect">
                                   <p:stCondLst>
                                     <p:cond delay="0"/>
                                   </p:stCondLst>
                                   <p:childTnLst>
                                     <p:set>
                                       <p:cBhvr>
-                                        <p:cTn id="22" dur="1" fill="hold">
+                                        <p:cTn id="16" dur="1" fill="hold">
                                           <p:stCondLst>
                                             <p:cond delay="0"/>
                                           </p:stCondLst>
@@ -10971,26 +10719,26 @@
                     </p:cTn>
                   </p:par>
                   <p:par>
-                    <p:cTn id="23" fill="hold">
+                    <p:cTn id="17" fill="hold">
                       <p:stCondLst>
                         <p:cond delay="indefinite"/>
                       </p:stCondLst>
                       <p:childTnLst>
                         <p:par>
-                          <p:cTn id="24" fill="hold">
+                          <p:cTn id="18" fill="hold">
                             <p:stCondLst>
                               <p:cond delay="0"/>
                             </p:stCondLst>
                             <p:childTnLst>
                               <p:par>
-                                <p:cTn id="25" presetID="1" presetClass="entr" presetSubtype="0" fill="hold" nodeType="clickEffect">
+                                <p:cTn id="19" presetID="1" presetClass="entr" presetSubtype="0" fill="hold" nodeType="clickEffect">
                                   <p:stCondLst>
                                     <p:cond delay="0"/>
                                   </p:stCondLst>
                                   <p:childTnLst>
                                     <p:set>
                                       <p:cBhvr>
-                                        <p:cTn id="26" dur="1" fill="hold">
+                                        <p:cTn id="20" dur="1" fill="hold">
                                           <p:stCondLst>
                                             <p:cond delay="0"/>
                                           </p:stCondLst>
@@ -11013,33 +10761,15 @@
                                   </p:childTnLst>
                                 </p:cTn>
                               </p:par>
-                            </p:childTnLst>
-                          </p:cTn>
-                        </p:par>
-                      </p:childTnLst>
-                    </p:cTn>
-                  </p:par>
-                  <p:par>
-                    <p:cTn id="27" fill="hold">
-                      <p:stCondLst>
-                        <p:cond delay="indefinite"/>
-                      </p:stCondLst>
-                      <p:childTnLst>
-                        <p:par>
-                          <p:cTn id="28" fill="hold">
-                            <p:stCondLst>
-                              <p:cond delay="0"/>
-                            </p:stCondLst>
-                            <p:childTnLst>
                               <p:par>
-                                <p:cTn id="29" presetID="1" presetClass="entr" presetSubtype="0" fill="hold" nodeType="clickEffect">
+                                <p:cTn id="21" presetID="1" presetClass="entr" presetSubtype="0" fill="hold" nodeType="withEffect">
                                   <p:stCondLst>
                                     <p:cond delay="0"/>
                                   </p:stCondLst>
                                   <p:childTnLst>
                                     <p:set>
                                       <p:cBhvr>
-                                        <p:cTn id="30" dur="1" fill="hold">
+                                        <p:cTn id="22" dur="1" fill="hold">
                                           <p:stCondLst>
                                             <p:cond delay="0"/>
                                           </p:stCondLst>
@@ -11062,33 +10792,15 @@
                                   </p:childTnLst>
                                 </p:cTn>
                               </p:par>
-                            </p:childTnLst>
-                          </p:cTn>
-                        </p:par>
-                      </p:childTnLst>
-                    </p:cTn>
-                  </p:par>
-                  <p:par>
-                    <p:cTn id="31" fill="hold">
-                      <p:stCondLst>
-                        <p:cond delay="indefinite"/>
-                      </p:stCondLst>
-                      <p:childTnLst>
-                        <p:par>
-                          <p:cTn id="32" fill="hold">
-                            <p:stCondLst>
-                              <p:cond delay="0"/>
-                            </p:stCondLst>
-                            <p:childTnLst>
                               <p:par>
-                                <p:cTn id="33" presetID="1" presetClass="entr" presetSubtype="0" fill="hold" nodeType="clickEffect">
+                                <p:cTn id="23" presetID="1" presetClass="entr" presetSubtype="0" fill="hold" nodeType="withEffect">
                                   <p:stCondLst>
                                     <p:cond delay="0"/>
                                   </p:stCondLst>
                                   <p:childTnLst>
                                     <p:set>
                                       <p:cBhvr>
-                                        <p:cTn id="34" dur="1" fill="hold">
+                                        <p:cTn id="24" dur="1" fill="hold">
                                           <p:stCondLst>
                                             <p:cond delay="0"/>
                                           </p:stCondLst>
@@ -40141,33 +39853,15 @@
                                   </p:childTnLst>
                                 </p:cTn>
                               </p:par>
-                            </p:childTnLst>
-                          </p:cTn>
-                        </p:par>
-                      </p:childTnLst>
-                    </p:cTn>
-                  </p:par>
-                  <p:par>
-                    <p:cTn id="15" fill="hold">
-                      <p:stCondLst>
-                        <p:cond delay="indefinite"/>
-                      </p:stCondLst>
-                      <p:childTnLst>
-                        <p:par>
-                          <p:cTn id="16" fill="hold">
-                            <p:stCondLst>
-                              <p:cond delay="0"/>
-                            </p:stCondLst>
-                            <p:childTnLst>
                               <p:par>
-                                <p:cTn id="17" presetID="1" presetClass="entr" presetSubtype="0" fill="hold" nodeType="clickEffect">
+                                <p:cTn id="15" presetID="1" presetClass="entr" presetSubtype="0" fill="hold" nodeType="withEffect">
                                   <p:stCondLst>
                                     <p:cond delay="0"/>
                                   </p:stCondLst>
                                   <p:childTnLst>
                                     <p:set>
                                       <p:cBhvr>
-                                        <p:cTn id="18" dur="1" fill="hold">
+                                        <p:cTn id="16" dur="1" fill="hold">
                                           <p:stCondLst>
                                             <p:cond delay="0"/>
                                           </p:stCondLst>
@@ -40197,26 +39891,26 @@
                     </p:cTn>
                   </p:par>
                   <p:par>
-                    <p:cTn id="19" fill="hold">
+                    <p:cTn id="17" fill="hold">
                       <p:stCondLst>
                         <p:cond delay="indefinite"/>
                       </p:stCondLst>
                       <p:childTnLst>
                         <p:par>
-                          <p:cTn id="20" fill="hold">
+                          <p:cTn id="18" fill="hold">
                             <p:stCondLst>
                               <p:cond delay="0"/>
                             </p:stCondLst>
                             <p:childTnLst>
                               <p:par>
-                                <p:cTn id="21" presetID="1" presetClass="entr" presetSubtype="0" fill="hold" nodeType="clickEffect">
+                                <p:cTn id="19" presetID="1" presetClass="entr" presetSubtype="0" fill="hold" nodeType="clickEffect">
                                   <p:stCondLst>
                                     <p:cond delay="0"/>
                                   </p:stCondLst>
                                   <p:childTnLst>
                                     <p:set>
                                       <p:cBhvr>
-                                        <p:cTn id="22" dur="1" fill="hold">
+                                        <p:cTn id="20" dur="1" fill="hold">
                                           <p:stCondLst>
                                             <p:cond delay="0"/>
                                           </p:stCondLst>
@@ -40692,33 +40386,15 @@
                                   </p:childTnLst>
                                 </p:cTn>
                               </p:par>
-                            </p:childTnLst>
-                          </p:cTn>
-                        </p:par>
-                      </p:childTnLst>
-                    </p:cTn>
-                  </p:par>
-                  <p:par>
-                    <p:cTn id="23" fill="hold">
-                      <p:stCondLst>
-                        <p:cond delay="indefinite"/>
-                      </p:stCondLst>
-                      <p:childTnLst>
-                        <p:par>
-                          <p:cTn id="24" fill="hold">
-                            <p:stCondLst>
-                              <p:cond delay="0"/>
-                            </p:stCondLst>
-                            <p:childTnLst>
                               <p:par>
-                                <p:cTn id="25" presetID="1" presetClass="entr" presetSubtype="0" fill="hold" nodeType="clickEffect">
+                                <p:cTn id="23" presetID="1" presetClass="entr" presetSubtype="0" fill="hold" nodeType="withEffect">
                                   <p:stCondLst>
                                     <p:cond delay="0"/>
                                   </p:stCondLst>
                                   <p:childTnLst>
                                     <p:set>
                                       <p:cBhvr>
-                                        <p:cTn id="26" dur="1" fill="hold">
+                                        <p:cTn id="24" dur="1" fill="hold">
                                           <p:stCondLst>
                                             <p:cond delay="0"/>
                                           </p:stCondLst>
@@ -40741,33 +40417,15 @@
                                   </p:childTnLst>
                                 </p:cTn>
                               </p:par>
-                            </p:childTnLst>
-                          </p:cTn>
-                        </p:par>
-                      </p:childTnLst>
-                    </p:cTn>
-                  </p:par>
-                  <p:par>
-                    <p:cTn id="27" fill="hold">
-                      <p:stCondLst>
-                        <p:cond delay="indefinite"/>
-                      </p:stCondLst>
-                      <p:childTnLst>
-                        <p:par>
-                          <p:cTn id="28" fill="hold">
-                            <p:stCondLst>
-                              <p:cond delay="0"/>
-                            </p:stCondLst>
-                            <p:childTnLst>
                               <p:par>
-                                <p:cTn id="29" presetID="1" presetClass="entr" presetSubtype="0" fill="hold" nodeType="clickEffect">
+                                <p:cTn id="25" presetID="1" presetClass="entr" presetSubtype="0" fill="hold" nodeType="withEffect">
                                   <p:stCondLst>
                                     <p:cond delay="0"/>
                                   </p:stCondLst>
                                   <p:childTnLst>
                                     <p:set>
                                       <p:cBhvr>
-                                        <p:cTn id="30" dur="1" fill="hold">
+                                        <p:cTn id="26" dur="1" fill="hold">
                                           <p:stCondLst>
                                             <p:cond delay="0"/>
                                           </p:stCondLst>
@@ -40790,33 +40448,15 @@
                                   </p:childTnLst>
                                 </p:cTn>
                               </p:par>
-                            </p:childTnLst>
-                          </p:cTn>
-                        </p:par>
-                      </p:childTnLst>
-                    </p:cTn>
-                  </p:par>
-                  <p:par>
-                    <p:cTn id="31" fill="hold">
-                      <p:stCondLst>
-                        <p:cond delay="indefinite"/>
-                      </p:stCondLst>
-                      <p:childTnLst>
-                        <p:par>
-                          <p:cTn id="32" fill="hold">
-                            <p:stCondLst>
-                              <p:cond delay="0"/>
-                            </p:stCondLst>
-                            <p:childTnLst>
                               <p:par>
-                                <p:cTn id="33" presetID="1" presetClass="entr" presetSubtype="0" fill="hold" nodeType="clickEffect">
+                                <p:cTn id="27" presetID="1" presetClass="entr" presetSubtype="0" fill="hold" nodeType="withEffect">
                                   <p:stCondLst>
                                     <p:cond delay="0"/>
                                   </p:stCondLst>
                                   <p:childTnLst>
                                     <p:set>
                                       <p:cBhvr>
-                                        <p:cTn id="34" dur="1" fill="hold">
+                                        <p:cTn id="28" dur="1" fill="hold">
                                           <p:stCondLst>
                                             <p:cond delay="0"/>
                                           </p:stCondLst>
@@ -41626,26 +41266,39 @@
                                   </p:childTnLst>
                                 </p:cTn>
                               </p:par>
-                            </p:childTnLst>
-                          </p:cTn>
-                        </p:par>
-                      </p:childTnLst>
-                    </p:cTn>
-                  </p:par>
-                  <p:par>
-                    <p:cTn id="11" fill="hold">
-                      <p:stCondLst>
-                        <p:cond delay="indefinite"/>
-                      </p:stCondLst>
-                      <p:childTnLst>
-                        <p:par>
-                          <p:cTn id="12" fill="hold">
-                            <p:stCondLst>
-                              <p:cond delay="0"/>
-                            </p:stCondLst>
-                            <p:childTnLst>
                               <p:par>
-                                <p:cTn id="13" presetID="1" presetClass="entr" presetSubtype="0" fill="hold" nodeType="clickEffect">
+                                <p:cTn id="11" presetID="1" presetClass="entr" presetSubtype="0" fill="hold" nodeType="withEffect">
+                                  <p:stCondLst>
+                                    <p:cond delay="0"/>
+                                  </p:stCondLst>
+                                  <p:childTnLst>
+                                    <p:set>
+                                      <p:cBhvr>
+                                        <p:cTn id="12" dur="1" fill="hold">
+                                          <p:stCondLst>
+                                            <p:cond delay="0"/>
+                                          </p:stCondLst>
+                                        </p:cTn>
+                                        <p:tgtEl>
+                                          <p:spTgt spid="3">
+                                            <p:txEl>
+                                              <p:pRg st="6" end="6"/>
+                                            </p:txEl>
+                                          </p:spTgt>
+                                        </p:tgtEl>
+                                        <p:attrNameLst>
+                                          <p:attrName>style.visibility</p:attrName>
+                                        </p:attrNameLst>
+                                      </p:cBhvr>
+                                      <p:to>
+                                        <p:strVal val="visible"/>
+                                      </p:to>
+                                    </p:set>
+                                  </p:childTnLst>
+                                </p:cTn>
+                              </p:par>
+                              <p:par>
+                                <p:cTn id="13" presetID="1" presetClass="entr" presetSubtype="0" fill="hold" nodeType="withEffect">
                                   <p:stCondLst>
                                     <p:cond delay="0"/>
                                   </p:stCondLst>
@@ -41660,7 +41313,7 @@
                                         <p:tgtEl>
                                           <p:spTgt spid="3">
                                             <p:txEl>
-                                              <p:pRg st="6" end="6"/>
+                                              <p:pRg st="7" end="7"/>
                                             </p:txEl>
                                           </p:spTgt>
                                         </p:tgtEl>
@@ -41702,55 +41355,6 @@
                                     <p:set>
                                       <p:cBhvr>
                                         <p:cTn id="18" dur="1" fill="hold">
-                                          <p:stCondLst>
-                                            <p:cond delay="0"/>
-                                          </p:stCondLst>
-                                        </p:cTn>
-                                        <p:tgtEl>
-                                          <p:spTgt spid="3">
-                                            <p:txEl>
-                                              <p:pRg st="7" end="7"/>
-                                            </p:txEl>
-                                          </p:spTgt>
-                                        </p:tgtEl>
-                                        <p:attrNameLst>
-                                          <p:attrName>style.visibility</p:attrName>
-                                        </p:attrNameLst>
-                                      </p:cBhvr>
-                                      <p:to>
-                                        <p:strVal val="visible"/>
-                                      </p:to>
-                                    </p:set>
-                                  </p:childTnLst>
-                                </p:cTn>
-                              </p:par>
-                            </p:childTnLst>
-                          </p:cTn>
-                        </p:par>
-                      </p:childTnLst>
-                    </p:cTn>
-                  </p:par>
-                  <p:par>
-                    <p:cTn id="19" fill="hold">
-                      <p:stCondLst>
-                        <p:cond delay="indefinite"/>
-                      </p:stCondLst>
-                      <p:childTnLst>
-                        <p:par>
-                          <p:cTn id="20" fill="hold">
-                            <p:stCondLst>
-                              <p:cond delay="0"/>
-                            </p:stCondLst>
-                            <p:childTnLst>
-                              <p:par>
-                                <p:cTn id="21" presetID="1" presetClass="entr" presetSubtype="0" fill="hold" nodeType="clickEffect">
-                                  <p:stCondLst>
-                                    <p:cond delay="0"/>
-                                  </p:stCondLst>
-                                  <p:childTnLst>
-                                    <p:set>
-                                      <p:cBhvr>
-                                        <p:cTn id="22" dur="1" fill="hold">
                                           <p:stCondLst>
                                             <p:cond delay="0"/>
                                           </p:stCondLst>

</xml_diff>

<commit_message>
Corrected minor typos, imporved math notation
</commit_message>
<xml_diff>
--- a/slides/9_IntroductionToClustering_Part2.pptx
+++ b/slides/9_IntroductionToClustering_Part2.pptx
@@ -246,7 +246,7 @@
           <a:p>
             <a:fld id="{ED460DB7-3564-4028-881B-4A225B453265}" type="datetimeFigureOut">
               <a:rPr lang="en-US" smtClean="0"/>
-              <a:t>7/16/2023</a:t>
+              <a:t>7/18/2023</a:t>
             </a:fld>
             <a:endParaRPr lang="en-US"/>
           </a:p>
@@ -3720,7 +3720,7 @@
           <a:p>
             <a:fld id="{C62B3463-61C8-4819-BC9A-C94FD847F060}" type="datetimeFigureOut">
               <a:rPr lang="en-US" smtClean="0"/>
-              <a:t>7/16/2023</a:t>
+              <a:t>7/18/2023</a:t>
             </a:fld>
             <a:endParaRPr lang="en-US"/>
           </a:p>
@@ -3918,7 +3918,7 @@
           <a:p>
             <a:fld id="{C62B3463-61C8-4819-BC9A-C94FD847F060}" type="datetimeFigureOut">
               <a:rPr lang="en-US" smtClean="0"/>
-              <a:t>7/16/2023</a:t>
+              <a:t>7/18/2023</a:t>
             </a:fld>
             <a:endParaRPr lang="en-US"/>
           </a:p>
@@ -4126,7 +4126,7 @@
           <a:p>
             <a:fld id="{C62B3463-61C8-4819-BC9A-C94FD847F060}" type="datetimeFigureOut">
               <a:rPr lang="en-US" smtClean="0"/>
-              <a:t>7/16/2023</a:t>
+              <a:t>7/18/2023</a:t>
             </a:fld>
             <a:endParaRPr lang="en-US"/>
           </a:p>
@@ -5546,7 +5546,7 @@
           <a:p>
             <a:fld id="{C62B3463-61C8-4819-BC9A-C94FD847F060}" type="datetimeFigureOut">
               <a:rPr lang="en-US" smtClean="0"/>
-              <a:t>7/16/2023</a:t>
+              <a:t>7/18/2023</a:t>
             </a:fld>
             <a:endParaRPr lang="en-US"/>
           </a:p>
@@ -5987,7 +5987,7 @@
           <a:p>
             <a:fld id="{4ACD6B4E-9726-48B7-95FC-86DC5068328F}" type="datetimeFigureOut">
               <a:rPr lang="en-US" smtClean="0"/>
-              <a:t>7/16/2023</a:t>
+              <a:t>7/18/2023</a:t>
             </a:fld>
             <a:endParaRPr lang="en-US"/>
           </a:p>
@@ -6262,7 +6262,7 @@
           <a:p>
             <a:fld id="{C62B3463-61C8-4819-BC9A-C94FD847F060}" type="datetimeFigureOut">
               <a:rPr lang="en-US" smtClean="0"/>
-              <a:t>7/16/2023</a:t>
+              <a:t>7/18/2023</a:t>
             </a:fld>
             <a:endParaRPr lang="en-US"/>
           </a:p>
@@ -6527,7 +6527,7 @@
           <a:p>
             <a:fld id="{C62B3463-61C8-4819-BC9A-C94FD847F060}" type="datetimeFigureOut">
               <a:rPr lang="en-US" smtClean="0"/>
-              <a:t>7/16/2023</a:t>
+              <a:t>7/18/2023</a:t>
             </a:fld>
             <a:endParaRPr lang="en-US"/>
           </a:p>
@@ -6939,7 +6939,7 @@
           <a:p>
             <a:fld id="{C62B3463-61C8-4819-BC9A-C94FD847F060}" type="datetimeFigureOut">
               <a:rPr lang="en-US" smtClean="0"/>
-              <a:t>7/16/2023</a:t>
+              <a:t>7/18/2023</a:t>
             </a:fld>
             <a:endParaRPr lang="en-US"/>
           </a:p>
@@ -7080,7 +7080,7 @@
           <a:p>
             <a:fld id="{C62B3463-61C8-4819-BC9A-C94FD847F060}" type="datetimeFigureOut">
               <a:rPr lang="en-US" smtClean="0"/>
-              <a:t>7/16/2023</a:t>
+              <a:t>7/18/2023</a:t>
             </a:fld>
             <a:endParaRPr lang="en-US"/>
           </a:p>
@@ -7193,7 +7193,7 @@
           <a:p>
             <a:fld id="{C62B3463-61C8-4819-BC9A-C94FD847F060}" type="datetimeFigureOut">
               <a:rPr lang="en-US" smtClean="0"/>
-              <a:t>7/16/2023</a:t>
+              <a:t>7/18/2023</a:t>
             </a:fld>
             <a:endParaRPr lang="en-US"/>
           </a:p>
@@ -7504,7 +7504,7 @@
           <a:p>
             <a:fld id="{C62B3463-61C8-4819-BC9A-C94FD847F060}" type="datetimeFigureOut">
               <a:rPr lang="en-US" smtClean="0"/>
-              <a:t>7/16/2023</a:t>
+              <a:t>7/18/2023</a:t>
             </a:fld>
             <a:endParaRPr lang="en-US"/>
           </a:p>
@@ -7792,7 +7792,7 @@
           <a:p>
             <a:fld id="{C62B3463-61C8-4819-BC9A-C94FD847F060}" type="datetimeFigureOut">
               <a:rPr lang="en-US" smtClean="0"/>
-              <a:t>7/16/2023</a:t>
+              <a:t>7/18/2023</a:t>
             </a:fld>
             <a:endParaRPr lang="en-US"/>
           </a:p>
@@ -8033,7 +8033,7 @@
           <a:p>
             <a:fld id="{C62B3463-61C8-4819-BC9A-C94FD847F060}" type="datetimeFigureOut">
               <a:rPr lang="en-US" smtClean="0"/>
-              <a:t>7/16/2023</a:t>
+              <a:t>7/18/2023</a:t>
             </a:fld>
             <a:endParaRPr lang="en-US"/>
           </a:p>
@@ -8805,7 +8805,7 @@
         </p:nvSpPr>
         <p:spPr>
           <a:xfrm>
-            <a:off x="587619" y="695131"/>
+            <a:off x="587619" y="968479"/>
             <a:ext cx="11016761" cy="2973777"/>
           </a:xfrm>
         </p:spPr>
@@ -8853,6 +8853,17 @@
                 <a:latin typeface="+mn-lt"/>
               </a:rPr>
               <a:t>Introduction to Clustering Models</a:t>
+            </a:r>
+            <a:br>
+              <a:rPr lang="en-US" dirty="0">
+                <a:latin typeface="+mn-lt"/>
+              </a:rPr>
+            </a:br>
+            <a:r>
+              <a:rPr lang="en-US" dirty="0">
+                <a:latin typeface="+mn-lt"/>
+              </a:rPr>
+              <a:t>Part 2</a:t>
             </a:r>
           </a:p>
         </p:txBody>
@@ -8875,7 +8886,7 @@
         </p:nvSpPr>
         <p:spPr>
           <a:xfrm>
-            <a:off x="1523999" y="3835092"/>
+            <a:off x="1524000" y="4000291"/>
             <a:ext cx="9144000" cy="494102"/>
           </a:xfrm>
         </p:spPr>
@@ -11540,7 +11551,19 @@
               <a:rPr lang="en-US" dirty="0">
                 <a:latin typeface="+mn-lt"/>
               </a:rPr>
-              <a:t>Can we build a clustering algorithm using a relationship to a few </a:t>
+              <a:t>Can we build a clustering algorithm using </a:t>
+            </a:r>
+            <a:r>
+              <a:rPr lang="en-US">
+                <a:latin typeface="+mn-lt"/>
+              </a:rPr>
+              <a:t>a mapping </a:t>
+            </a:r>
+            <a:r>
+              <a:rPr lang="en-US" dirty="0">
+                <a:latin typeface="+mn-lt"/>
+              </a:rPr>
+              <a:t>to a few </a:t>
             </a:r>
             <a:r>
               <a:rPr lang="en-US" b="1" dirty="0">
@@ -12665,8 +12688,8 @@
           </a:p>
         </p:txBody>
       </p:sp>
-      <mc:AlternateContent xmlns:mc="http://schemas.openxmlformats.org/markup-compatibility/2006">
-        <mc:Choice xmlns:a14="http://schemas.microsoft.com/office/drawing/2010/main" Requires="a14">
+      <mc:AlternateContent xmlns:mc="http://schemas.openxmlformats.org/markup-compatibility/2006" xmlns:a14="http://schemas.microsoft.com/office/drawing/2010/main">
+        <mc:Choice Requires="a14">
           <p:sp>
             <p:nvSpPr>
               <p:cNvPr id="3" name="Content Placeholder 2"/>
@@ -13552,7 +13575,7 @@
             </p:txBody>
           </p:sp>
         </mc:Choice>
-        <mc:Fallback>
+        <mc:Fallback xmlns="">
           <p:sp>
             <p:nvSpPr>
               <p:cNvPr id="3" name="Content Placeholder 2"/>

</xml_diff>

<commit_message>
Corrections and langauge improvements to slides
</commit_message>
<xml_diff>
--- a/slides/9_IntroductionToClustering_Part2.pptx
+++ b/slides/9_IntroductionToClustering_Part2.pptx
@@ -11551,19 +11551,7 @@
               <a:rPr lang="en-US" dirty="0">
                 <a:latin typeface="+mn-lt"/>
               </a:rPr>
-              <a:t>Can we build a clustering algorithm using </a:t>
-            </a:r>
-            <a:r>
-              <a:rPr lang="en-US">
-                <a:latin typeface="+mn-lt"/>
-              </a:rPr>
-              <a:t>a mapping </a:t>
-            </a:r>
-            <a:r>
-              <a:rPr lang="en-US" dirty="0">
-                <a:latin typeface="+mn-lt"/>
-              </a:rPr>
-              <a:t>to a few </a:t>
+              <a:t>Can we build a clustering algorithm using a mapping to a few </a:t>
             </a:r>
             <a:r>
               <a:rPr lang="en-US" b="1" dirty="0">
@@ -16286,7 +16274,7 @@
               <a:rPr lang="en-US" b="1" dirty="0">
                 <a:latin typeface="+mn-lt"/>
               </a:rPr>
-              <a:t>not reachable</a:t>
+              <a:t>non-reachable</a:t>
             </a:r>
           </a:p>
           <a:p>

</xml_diff>